<commit_message>
uml/aggregation: extract notation as separate diagram
</commit_message>
<xml_diff>
--- a/diagrams/uml/classDiagrams/aggregation/clubPerson.pptx
+++ b/diagrams/uml/classDiagrams/aggregation/clubPerson.pptx
@@ -104,6 +104,22 @@
       </a:defRPr>
     </a:lvl9pPr>
   </p:defaultTextStyle>
+  <p:extLst>
+    <p:ext uri="{EFAFB233-063F-42B5-8137-9DF3F51BA10A}">
+      <p15:sldGuideLst xmlns:p15="http://schemas.microsoft.com/office/powerpoint/2012/main">
+        <p15:guide id="1" orient="horz" pos="2160">
+          <p15:clr>
+            <a:srgbClr val="A4A3A4"/>
+          </p15:clr>
+        </p15:guide>
+        <p15:guide id="2" pos="2880">
+          <p15:clr>
+            <a:srgbClr val="A4A3A4"/>
+          </p15:clr>
+        </p15:guide>
+      </p15:sldGuideLst>
+    </p:ext>
+  </p:extLst>
 </p:presentation>
 </file>
 
@@ -288,7 +304,7 @@
           <a:p>
             <a:fld id="{A0F86979-30DA-49EE-A740-32EBA6D2B7DE}" type="datetimeFigureOut">
               <a:rPr lang="en-SG" smtClean="0"/>
-              <a:t>2/6/2017</a:t>
+              <a:t>29/3/2018</a:t>
             </a:fld>
             <a:endParaRPr lang="en-SG"/>
           </a:p>
@@ -458,7 +474,7 @@
           <a:p>
             <a:fld id="{A0F86979-30DA-49EE-A740-32EBA6D2B7DE}" type="datetimeFigureOut">
               <a:rPr lang="en-SG" smtClean="0"/>
-              <a:t>2/6/2017</a:t>
+              <a:t>29/3/2018</a:t>
             </a:fld>
             <a:endParaRPr lang="en-SG"/>
           </a:p>
@@ -638,7 +654,7 @@
           <a:p>
             <a:fld id="{A0F86979-30DA-49EE-A740-32EBA6D2B7DE}" type="datetimeFigureOut">
               <a:rPr lang="en-SG" smtClean="0"/>
-              <a:t>2/6/2017</a:t>
+              <a:t>29/3/2018</a:t>
             </a:fld>
             <a:endParaRPr lang="en-SG"/>
           </a:p>
@@ -808,7 +824,7 @@
           <a:p>
             <a:fld id="{A0F86979-30DA-49EE-A740-32EBA6D2B7DE}" type="datetimeFigureOut">
               <a:rPr lang="en-SG" smtClean="0"/>
-              <a:t>2/6/2017</a:t>
+              <a:t>29/3/2018</a:t>
             </a:fld>
             <a:endParaRPr lang="en-SG"/>
           </a:p>
@@ -1054,7 +1070,7 @@
           <a:p>
             <a:fld id="{A0F86979-30DA-49EE-A740-32EBA6D2B7DE}" type="datetimeFigureOut">
               <a:rPr lang="en-SG" smtClean="0"/>
-              <a:t>2/6/2017</a:t>
+              <a:t>29/3/2018</a:t>
             </a:fld>
             <a:endParaRPr lang="en-SG"/>
           </a:p>
@@ -1342,7 +1358,7 @@
           <a:p>
             <a:fld id="{A0F86979-30DA-49EE-A740-32EBA6D2B7DE}" type="datetimeFigureOut">
               <a:rPr lang="en-SG" smtClean="0"/>
-              <a:t>2/6/2017</a:t>
+              <a:t>29/3/2018</a:t>
             </a:fld>
             <a:endParaRPr lang="en-SG"/>
           </a:p>
@@ -1764,7 +1780,7 @@
           <a:p>
             <a:fld id="{A0F86979-30DA-49EE-A740-32EBA6D2B7DE}" type="datetimeFigureOut">
               <a:rPr lang="en-SG" smtClean="0"/>
-              <a:t>2/6/2017</a:t>
+              <a:t>29/3/2018</a:t>
             </a:fld>
             <a:endParaRPr lang="en-SG"/>
           </a:p>
@@ -1882,7 +1898,7 @@
           <a:p>
             <a:fld id="{A0F86979-30DA-49EE-A740-32EBA6D2B7DE}" type="datetimeFigureOut">
               <a:rPr lang="en-SG" smtClean="0"/>
-              <a:t>2/6/2017</a:t>
+              <a:t>29/3/2018</a:t>
             </a:fld>
             <a:endParaRPr lang="en-SG"/>
           </a:p>
@@ -1977,7 +1993,7 @@
           <a:p>
             <a:fld id="{A0F86979-30DA-49EE-A740-32EBA6D2B7DE}" type="datetimeFigureOut">
               <a:rPr lang="en-SG" smtClean="0"/>
-              <a:t>2/6/2017</a:t>
+              <a:t>29/3/2018</a:t>
             </a:fld>
             <a:endParaRPr lang="en-SG"/>
           </a:p>
@@ -2254,7 +2270,7 @@
           <a:p>
             <a:fld id="{A0F86979-30DA-49EE-A740-32EBA6D2B7DE}" type="datetimeFigureOut">
               <a:rPr lang="en-SG" smtClean="0"/>
-              <a:t>2/6/2017</a:t>
+              <a:t>29/3/2018</a:t>
             </a:fld>
             <a:endParaRPr lang="en-SG"/>
           </a:p>
@@ -2507,7 +2523,7 @@
           <a:p>
             <a:fld id="{A0F86979-30DA-49EE-A740-32EBA6D2B7DE}" type="datetimeFigureOut">
               <a:rPr lang="en-SG" smtClean="0"/>
-              <a:t>2/6/2017</a:t>
+              <a:t>29/3/2018</a:t>
             </a:fld>
             <a:endParaRPr lang="en-SG"/>
           </a:p>
@@ -2720,7 +2736,7 @@
           <a:p>
             <a:fld id="{A0F86979-30DA-49EE-A740-32EBA6D2B7DE}" type="datetimeFigureOut">
               <a:rPr lang="en-SG" smtClean="0"/>
-              <a:t>2/6/2017</a:t>
+              <a:t>29/3/2018</a:t>
             </a:fld>
             <a:endParaRPr lang="en-SG"/>
           </a:p>
@@ -3097,14 +3113,14 @@
       </p:grpSpPr>
       <p:sp>
         <p:nvSpPr>
-          <p:cNvPr id="4" name="Rectangle 3"/>
+          <p:cNvPr id="10" name="Rectangle 9"/>
           <p:cNvSpPr/>
           <p:nvPr/>
         </p:nvSpPr>
         <p:spPr>
           <a:xfrm>
-            <a:off x="4800600" y="3657599"/>
-            <a:ext cx="1143000" cy="369332"/>
+            <a:off x="1066800" y="3429000"/>
+            <a:ext cx="685800" cy="369332"/>
           </a:xfrm>
           <a:prstGeom prst="rect">
             <a:avLst/>
@@ -3112,6 +3128,7 @@
           <a:solidFill>
             <a:schemeClr val="bg1"/>
           </a:solidFill>
+          <a:ln w="19050"/>
         </p:spPr>
         <p:style>
           <a:lnRef idx="1">
@@ -3135,7 +3152,7 @@
           <a:p>
             <a:r>
               <a:rPr lang="en-US" dirty="0" smtClean="0"/>
-              <a:t>Container</a:t>
+              <a:t>Club</a:t>
             </a:r>
             <a:endParaRPr lang="en-US" dirty="0"/>
           </a:p>
@@ -3143,99 +3160,14 @@
       </p:sp>
       <p:sp>
         <p:nvSpPr>
-          <p:cNvPr id="5" name="Folded Corner 4"/>
+          <p:cNvPr id="11" name="Rectangle 10"/>
           <p:cNvSpPr/>
           <p:nvPr/>
         </p:nvSpPr>
         <p:spPr>
           <a:xfrm>
-            <a:off x="4648200" y="3047999"/>
-            <a:ext cx="3581400" cy="1295400"/>
-          </a:xfrm>
-          <a:prstGeom prst="foldedCorner">
-            <a:avLst/>
-          </a:prstGeom>
-          <a:noFill/>
-          <a:ln w="9525">
-            <a:solidFill>
-              <a:schemeClr val="accent1">
-                <a:lumMod val="75000"/>
-              </a:schemeClr>
-            </a:solidFill>
-            <a:prstDash val="sysDash"/>
-          </a:ln>
-        </p:spPr>
-        <p:style>
-          <a:lnRef idx="2">
-            <a:schemeClr val="accent1">
-              <a:shade val="50000"/>
-            </a:schemeClr>
-          </a:lnRef>
-          <a:fillRef idx="1">
-            <a:schemeClr val="accent1"/>
-          </a:fillRef>
-          <a:effectRef idx="0">
-            <a:schemeClr val="accent1"/>
-          </a:effectRef>
-          <a:fontRef idx="minor">
-            <a:schemeClr val="lt1"/>
-          </a:fontRef>
-        </p:style>
-        <p:txBody>
-          <a:bodyPr rtlCol="0" anchor="ctr"/>
-          <a:lstStyle/>
-          <a:p>
-            <a:pPr algn="ctr"/>
-            <a:endParaRPr lang="en-US" dirty="0"/>
-          </a:p>
-        </p:txBody>
-      </p:sp>
-      <p:sp>
-        <p:nvSpPr>
-          <p:cNvPr id="6" name="TextBox 5"/>
-          <p:cNvSpPr txBox="1"/>
-          <p:nvPr/>
-        </p:nvSpPr>
-        <p:spPr>
-          <a:xfrm>
-            <a:off x="4648200" y="3048000"/>
-            <a:ext cx="3581400" cy="369332"/>
-          </a:xfrm>
-          <a:prstGeom prst="rect">
-            <a:avLst/>
-          </a:prstGeom>
-          <a:solidFill>
-            <a:schemeClr val="accent1">
-              <a:lumMod val="40000"/>
-              <a:lumOff val="60000"/>
-            </a:schemeClr>
-          </a:solidFill>
-        </p:spPr>
-        <p:txBody>
-          <a:bodyPr wrap="square" rtlCol="0">
-            <a:spAutoFit/>
-          </a:bodyPr>
-          <a:lstStyle/>
-          <a:p>
-            <a:pPr algn="ctr"/>
-            <a:r>
-              <a:rPr lang="en-US" dirty="0" smtClean="0"/>
-              <a:t>UML Notation : Aggregation</a:t>
-            </a:r>
-            <a:endParaRPr lang="en-US" dirty="0"/>
-          </a:p>
-        </p:txBody>
-      </p:sp>
-      <p:sp>
-        <p:nvSpPr>
-          <p:cNvPr id="7" name="Rectangle 6"/>
-          <p:cNvSpPr/>
-          <p:nvPr/>
-        </p:nvSpPr>
-        <p:spPr>
-          <a:xfrm>
-            <a:off x="7010400" y="3663433"/>
-            <a:ext cx="1143000" cy="369332"/>
+            <a:off x="2819400" y="3434834"/>
+            <a:ext cx="914400" cy="369332"/>
           </a:xfrm>
           <a:prstGeom prst="rect">
             <a:avLst/>
@@ -3243,6 +3175,7 @@
           <a:solidFill>
             <a:schemeClr val="bg1"/>
           </a:solidFill>
+          <a:ln w="19050"/>
         </p:spPr>
         <p:style>
           <a:lnRef idx="1">
@@ -3266,7 +3199,7 @@
           <a:p>
             <a:r>
               <a:rPr lang="en-US" dirty="0" smtClean="0"/>
-              <a:t>Contained</a:t>
+              <a:t>Person</a:t>
             </a:r>
             <a:endParaRPr lang="en-US" dirty="0"/>
           </a:p>
@@ -3274,16 +3207,16 @@
       </p:sp>
       <p:cxnSp>
         <p:nvCxnSpPr>
-          <p:cNvPr id="8" name="Elbow Connector 7"/>
+          <p:cNvPr id="12" name="Elbow Connector 11"/>
           <p:cNvCxnSpPr>
-            <a:stCxn id="4" idx="3"/>
-            <a:endCxn id="7" idx="1"/>
+            <a:stCxn id="10" idx="3"/>
+            <a:endCxn id="11" idx="1"/>
           </p:cNvCxnSpPr>
           <p:nvPr/>
         </p:nvCxnSpPr>
         <p:spPr>
           <a:xfrm>
-            <a:off x="5943600" y="3842265"/>
+            <a:off x="1752600" y="3613666"/>
             <a:ext cx="1066800" cy="5834"/>
           </a:xfrm>
           <a:prstGeom prst="bentConnector3">
@@ -3291,7 +3224,7 @@
               <a:gd name="adj1" fmla="val 50000"/>
             </a:avLst>
           </a:prstGeom>
-          <a:ln>
+          <a:ln w="19050">
             <a:solidFill>
               <a:schemeClr val="tx1"/>
             </a:solidFill>
@@ -3314,13 +3247,13 @@
       </p:cxnSp>
       <p:sp>
         <p:nvSpPr>
-          <p:cNvPr id="9" name="Flowchart: Decision 8"/>
+          <p:cNvPr id="13" name="Flowchart: Decision 12"/>
           <p:cNvSpPr/>
           <p:nvPr/>
         </p:nvSpPr>
         <p:spPr>
           <a:xfrm>
-            <a:off x="5943600" y="3739633"/>
+            <a:off x="1752600" y="3511034"/>
             <a:ext cx="228600" cy="228600"/>
           </a:xfrm>
           <a:prstGeom prst="flowChartDecision">
@@ -3329,7 +3262,7 @@
           <a:solidFill>
             <a:schemeClr val="bg1"/>
           </a:solidFill>
-          <a:ln>
+          <a:ln w="19050">
             <a:solidFill>
               <a:schemeClr val="tx1"/>
             </a:solidFill>
@@ -3362,186 +3295,6 @@
       </p:sp>
       <p:sp>
         <p:nvSpPr>
-          <p:cNvPr id="10" name="Rectangle 9"/>
-          <p:cNvSpPr/>
-          <p:nvPr/>
-        </p:nvSpPr>
-        <p:spPr>
-          <a:xfrm>
-            <a:off x="1066800" y="3429000"/>
-            <a:ext cx="685800" cy="369332"/>
-          </a:xfrm>
-          <a:prstGeom prst="rect">
-            <a:avLst/>
-          </a:prstGeom>
-          <a:solidFill>
-            <a:schemeClr val="bg1"/>
-          </a:solidFill>
-        </p:spPr>
-        <p:style>
-          <a:lnRef idx="1">
-            <a:schemeClr val="accent4"/>
-          </a:lnRef>
-          <a:fillRef idx="2">
-            <a:schemeClr val="accent4"/>
-          </a:fillRef>
-          <a:effectRef idx="1">
-            <a:schemeClr val="accent4"/>
-          </a:effectRef>
-          <a:fontRef idx="minor">
-            <a:schemeClr val="dk1"/>
-          </a:fontRef>
-        </p:style>
-        <p:txBody>
-          <a:bodyPr wrap="square" rtlCol="0" anchor="ctr">
-            <a:spAutoFit/>
-          </a:bodyPr>
-          <a:lstStyle/>
-          <a:p>
-            <a:r>
-              <a:rPr lang="en-US" dirty="0" smtClean="0"/>
-              <a:t>Club</a:t>
-            </a:r>
-            <a:endParaRPr lang="en-US" dirty="0"/>
-          </a:p>
-        </p:txBody>
-      </p:sp>
-      <p:sp>
-        <p:nvSpPr>
-          <p:cNvPr id="11" name="Rectangle 10"/>
-          <p:cNvSpPr/>
-          <p:nvPr/>
-        </p:nvSpPr>
-        <p:spPr>
-          <a:xfrm>
-            <a:off x="2819400" y="3434834"/>
-            <a:ext cx="914400" cy="369332"/>
-          </a:xfrm>
-          <a:prstGeom prst="rect">
-            <a:avLst/>
-          </a:prstGeom>
-          <a:solidFill>
-            <a:schemeClr val="bg1"/>
-          </a:solidFill>
-        </p:spPr>
-        <p:style>
-          <a:lnRef idx="1">
-            <a:schemeClr val="accent4"/>
-          </a:lnRef>
-          <a:fillRef idx="2">
-            <a:schemeClr val="accent4"/>
-          </a:fillRef>
-          <a:effectRef idx="1">
-            <a:schemeClr val="accent4"/>
-          </a:effectRef>
-          <a:fontRef idx="minor">
-            <a:schemeClr val="dk1"/>
-          </a:fontRef>
-        </p:style>
-        <p:txBody>
-          <a:bodyPr wrap="square" rtlCol="0" anchor="ctr">
-            <a:spAutoFit/>
-          </a:bodyPr>
-          <a:lstStyle/>
-          <a:p>
-            <a:r>
-              <a:rPr lang="en-US" dirty="0" smtClean="0"/>
-              <a:t>Person</a:t>
-            </a:r>
-            <a:endParaRPr lang="en-US" dirty="0"/>
-          </a:p>
-        </p:txBody>
-      </p:sp>
-      <p:cxnSp>
-        <p:nvCxnSpPr>
-          <p:cNvPr id="12" name="Elbow Connector 11"/>
-          <p:cNvCxnSpPr>
-            <a:stCxn id="10" idx="3"/>
-            <a:endCxn id="11" idx="1"/>
-          </p:cNvCxnSpPr>
-          <p:nvPr/>
-        </p:nvCxnSpPr>
-        <p:spPr>
-          <a:xfrm>
-            <a:off x="1752600" y="3613666"/>
-            <a:ext cx="1066800" cy="5834"/>
-          </a:xfrm>
-          <a:prstGeom prst="bentConnector3">
-            <a:avLst>
-              <a:gd name="adj1" fmla="val 50000"/>
-            </a:avLst>
-          </a:prstGeom>
-          <a:ln>
-            <a:solidFill>
-              <a:schemeClr val="tx1"/>
-            </a:solidFill>
-          </a:ln>
-        </p:spPr>
-        <p:style>
-          <a:lnRef idx="1">
-            <a:schemeClr val="accent1"/>
-          </a:lnRef>
-          <a:fillRef idx="0">
-            <a:schemeClr val="accent1"/>
-          </a:fillRef>
-          <a:effectRef idx="0">
-            <a:schemeClr val="accent1"/>
-          </a:effectRef>
-          <a:fontRef idx="minor">
-            <a:schemeClr val="tx1"/>
-          </a:fontRef>
-        </p:style>
-      </p:cxnSp>
-      <p:sp>
-        <p:nvSpPr>
-          <p:cNvPr id="13" name="Flowchart: Decision 12"/>
-          <p:cNvSpPr/>
-          <p:nvPr/>
-        </p:nvSpPr>
-        <p:spPr>
-          <a:xfrm>
-            <a:off x="1752600" y="3511034"/>
-            <a:ext cx="228600" cy="228600"/>
-          </a:xfrm>
-          <a:prstGeom prst="flowChartDecision">
-            <a:avLst/>
-          </a:prstGeom>
-          <a:solidFill>
-            <a:schemeClr val="bg1"/>
-          </a:solidFill>
-          <a:ln>
-            <a:solidFill>
-              <a:schemeClr val="tx1"/>
-            </a:solidFill>
-          </a:ln>
-        </p:spPr>
-        <p:style>
-          <a:lnRef idx="2">
-            <a:schemeClr val="accent1">
-              <a:shade val="50000"/>
-            </a:schemeClr>
-          </a:lnRef>
-          <a:fillRef idx="1">
-            <a:schemeClr val="accent1"/>
-          </a:fillRef>
-          <a:effectRef idx="0">
-            <a:schemeClr val="accent1"/>
-          </a:effectRef>
-          <a:fontRef idx="minor">
-            <a:schemeClr val="lt1"/>
-          </a:fontRef>
-        </p:style>
-        <p:txBody>
-          <a:bodyPr rtlCol="0" anchor="ctr"/>
-          <a:lstStyle/>
-          <a:p>
-            <a:pPr algn="ctr"/>
-            <a:endParaRPr lang="en-US"/>
-          </a:p>
-        </p:txBody>
-      </p:sp>
-      <p:sp>
-        <p:nvSpPr>
           <p:cNvPr id="14" name="TextBox 13"/>
           <p:cNvSpPr txBox="1"/>
           <p:nvPr/>
@@ -3611,7 +3364,7 @@
         </p:nvSpPr>
         <p:spPr>
           <a:xfrm>
-            <a:off x="2209800" y="3200400"/>
+            <a:off x="2286000" y="3244334"/>
             <a:ext cx="533400" cy="369332"/>
           </a:xfrm>
           <a:prstGeom prst="rect">
@@ -3713,7 +3466,7 @@
                                           </p:stCondLst>
                                         </p:cTn>
                                         <p:tgtEl>
-                                          <p:spTgt spid="4"/>
+                                          <p:spTgt spid="10"/>
                                         </p:tgtEl>
                                         <p:attrNameLst>
                                           <p:attrName>style.visibility</p:attrName>
@@ -3740,141 +3493,6 @@
                                           </p:stCondLst>
                                         </p:cTn>
                                         <p:tgtEl>
-                                          <p:spTgt spid="5"/>
-                                        </p:tgtEl>
-                                        <p:attrNameLst>
-                                          <p:attrName>style.visibility</p:attrName>
-                                        </p:attrNameLst>
-                                      </p:cBhvr>
-                                      <p:to>
-                                        <p:strVal val="visible"/>
-                                      </p:to>
-                                    </p:set>
-                                  </p:childTnLst>
-                                </p:cTn>
-                              </p:par>
-                              <p:par>
-                                <p:cTn id="9" presetID="1" presetClass="entr" presetSubtype="0" fill="hold" grpId="0" nodeType="withEffect">
-                                  <p:stCondLst>
-                                    <p:cond delay="0"/>
-                                  </p:stCondLst>
-                                  <p:childTnLst>
-                                    <p:set>
-                                      <p:cBhvr>
-                                        <p:cTn id="10" dur="1" fill="hold">
-                                          <p:stCondLst>
-                                            <p:cond delay="0"/>
-                                          </p:stCondLst>
-                                        </p:cTn>
-                                        <p:tgtEl>
-                                          <p:spTgt spid="6"/>
-                                        </p:tgtEl>
-                                        <p:attrNameLst>
-                                          <p:attrName>style.visibility</p:attrName>
-                                        </p:attrNameLst>
-                                      </p:cBhvr>
-                                      <p:to>
-                                        <p:strVal val="visible"/>
-                                      </p:to>
-                                    </p:set>
-                                  </p:childTnLst>
-                                </p:cTn>
-                              </p:par>
-                              <p:par>
-                                <p:cTn id="11" presetID="1" presetClass="entr" presetSubtype="0" fill="hold" grpId="0" nodeType="withEffect">
-                                  <p:stCondLst>
-                                    <p:cond delay="0"/>
-                                  </p:stCondLst>
-                                  <p:childTnLst>
-                                    <p:set>
-                                      <p:cBhvr>
-                                        <p:cTn id="12" dur="1" fill="hold">
-                                          <p:stCondLst>
-                                            <p:cond delay="0"/>
-                                          </p:stCondLst>
-                                        </p:cTn>
-                                        <p:tgtEl>
-                                          <p:spTgt spid="7"/>
-                                        </p:tgtEl>
-                                        <p:attrNameLst>
-                                          <p:attrName>style.visibility</p:attrName>
-                                        </p:attrNameLst>
-                                      </p:cBhvr>
-                                      <p:to>
-                                        <p:strVal val="visible"/>
-                                      </p:to>
-                                    </p:set>
-                                  </p:childTnLst>
-                                </p:cTn>
-                              </p:par>
-                              <p:par>
-                                <p:cTn id="13" presetID="1" presetClass="entr" presetSubtype="0" fill="hold" nodeType="withEffect">
-                                  <p:stCondLst>
-                                    <p:cond delay="0"/>
-                                  </p:stCondLst>
-                                  <p:childTnLst>
-                                    <p:set>
-                                      <p:cBhvr>
-                                        <p:cTn id="14" dur="1" fill="hold">
-                                          <p:stCondLst>
-                                            <p:cond delay="0"/>
-                                          </p:stCondLst>
-                                        </p:cTn>
-                                        <p:tgtEl>
-                                          <p:spTgt spid="8"/>
-                                        </p:tgtEl>
-                                        <p:attrNameLst>
-                                          <p:attrName>style.visibility</p:attrName>
-                                        </p:attrNameLst>
-                                      </p:cBhvr>
-                                      <p:to>
-                                        <p:strVal val="visible"/>
-                                      </p:to>
-                                    </p:set>
-                                  </p:childTnLst>
-                                </p:cTn>
-                              </p:par>
-                              <p:par>
-                                <p:cTn id="15" presetID="1" presetClass="entr" presetSubtype="0" fill="hold" grpId="0" nodeType="withEffect">
-                                  <p:stCondLst>
-                                    <p:cond delay="0"/>
-                                  </p:stCondLst>
-                                  <p:childTnLst>
-                                    <p:set>
-                                      <p:cBhvr>
-                                        <p:cTn id="16" dur="1" fill="hold">
-                                          <p:stCondLst>
-                                            <p:cond delay="0"/>
-                                          </p:stCondLst>
-                                        </p:cTn>
-                                        <p:tgtEl>
-                                          <p:spTgt spid="10"/>
-                                        </p:tgtEl>
-                                        <p:attrNameLst>
-                                          <p:attrName>style.visibility</p:attrName>
-                                        </p:attrNameLst>
-                                      </p:cBhvr>
-                                      <p:to>
-                                        <p:strVal val="visible"/>
-                                      </p:to>
-                                    </p:set>
-                                  </p:childTnLst>
-                                </p:cTn>
-                              </p:par>
-                              <p:par>
-                                <p:cTn id="17" presetID="1" presetClass="entr" presetSubtype="0" fill="hold" grpId="0" nodeType="withEffect">
-                                  <p:stCondLst>
-                                    <p:cond delay="0"/>
-                                  </p:stCondLst>
-                                  <p:childTnLst>
-                                    <p:set>
-                                      <p:cBhvr>
-                                        <p:cTn id="18" dur="1" fill="hold">
-                                          <p:stCondLst>
-                                            <p:cond delay="0"/>
-                                          </p:stCondLst>
-                                        </p:cTn>
-                                        <p:tgtEl>
                                           <p:spTgt spid="11"/>
                                         </p:tgtEl>
                                         <p:attrNameLst>
@@ -3889,14 +3507,14 @@
                                 </p:cTn>
                               </p:par>
                               <p:par>
-                                <p:cTn id="19" presetID="1" presetClass="entr" presetSubtype="0" fill="hold" nodeType="withEffect">
+                                <p:cTn id="9" presetID="1" presetClass="entr" presetSubtype="0" fill="hold" nodeType="withEffect">
                                   <p:stCondLst>
                                     <p:cond delay="0"/>
                                   </p:stCondLst>
                                   <p:childTnLst>
                                     <p:set>
                                       <p:cBhvr>
-                                        <p:cTn id="20" dur="1" fill="hold">
+                                        <p:cTn id="10" dur="1" fill="hold">
                                           <p:stCondLst>
                                             <p:cond delay="0"/>
                                           </p:stCondLst>
@@ -3943,10 +3561,6 @@
       </p:par>
     </p:tnLst>
     <p:bldLst>
-      <p:bldP spid="4" grpId="0" animBg="1"/>
-      <p:bldP spid="5" grpId="0" animBg="1"/>
-      <p:bldP spid="6" grpId="0" animBg="1"/>
-      <p:bldP spid="7" grpId="0" animBg="1"/>
       <p:bldP spid="10" grpId="0" animBg="1"/>
       <p:bldP spid="11" grpId="0" animBg="1"/>
     </p:bldLst>

</xml_diff>